<commit_message>
Last Update 01-08-2019 12:51:51.39
</commit_message>
<xml_diff>
--- a/Lab/Ex 11 Most Frequent Word in File/GE8151-E11-Flowchart.pptx
+++ b/Lab/Ex 11 Most Frequent Word in File/GE8151-E11-Flowchart.pptx
@@ -196,7 +196,7 @@
             <a:fld id="{5DF6688B-E7FC-4296-98AB-DDD1B8D062EB}" type="datetimeFigureOut">
               <a:rPr lang="en-US" smtClean="0"/>
               <a:pPr/>
-              <a:t>11/29/2018</a:t>
+              <a:t>7/25/2019</a:t>
             </a:fld>
             <a:endParaRPr lang="en-US"/>
           </a:p>
@@ -726,7 +726,7 @@
             <a:fld id="{A9953F39-409C-4934-84CB-8EF94422C604}" type="datetimeFigureOut">
               <a:rPr lang="en-US" smtClean="0"/>
               <a:pPr/>
-              <a:t>11/29/2018</a:t>
+              <a:t>7/25/2019</a:t>
             </a:fld>
             <a:endParaRPr lang="en-US"/>
           </a:p>
@@ -893,7 +893,7 @@
             <a:fld id="{A9953F39-409C-4934-84CB-8EF94422C604}" type="datetimeFigureOut">
               <a:rPr lang="en-US" smtClean="0"/>
               <a:pPr/>
-              <a:t>11/29/2018</a:t>
+              <a:t>7/25/2019</a:t>
             </a:fld>
             <a:endParaRPr lang="en-US"/>
           </a:p>
@@ -1070,7 +1070,7 @@
             <a:fld id="{A9953F39-409C-4934-84CB-8EF94422C604}" type="datetimeFigureOut">
               <a:rPr lang="en-US" smtClean="0"/>
               <a:pPr/>
-              <a:t>11/29/2018</a:t>
+              <a:t>7/25/2019</a:t>
             </a:fld>
             <a:endParaRPr lang="en-US"/>
           </a:p>
@@ -1237,7 +1237,7 @@
             <a:fld id="{A9953F39-409C-4934-84CB-8EF94422C604}" type="datetimeFigureOut">
               <a:rPr lang="en-US" smtClean="0"/>
               <a:pPr/>
-              <a:t>11/29/2018</a:t>
+              <a:t>7/25/2019</a:t>
             </a:fld>
             <a:endParaRPr lang="en-US"/>
           </a:p>
@@ -1480,7 +1480,7 @@
             <a:fld id="{A9953F39-409C-4934-84CB-8EF94422C604}" type="datetimeFigureOut">
               <a:rPr lang="en-US" smtClean="0"/>
               <a:pPr/>
-              <a:t>11/29/2018</a:t>
+              <a:t>7/25/2019</a:t>
             </a:fld>
             <a:endParaRPr lang="en-US"/>
           </a:p>
@@ -1765,7 +1765,7 @@
             <a:fld id="{A9953F39-409C-4934-84CB-8EF94422C604}" type="datetimeFigureOut">
               <a:rPr lang="en-US" smtClean="0"/>
               <a:pPr/>
-              <a:t>11/29/2018</a:t>
+              <a:t>7/25/2019</a:t>
             </a:fld>
             <a:endParaRPr lang="en-US"/>
           </a:p>
@@ -2184,7 +2184,7 @@
             <a:fld id="{A9953F39-409C-4934-84CB-8EF94422C604}" type="datetimeFigureOut">
               <a:rPr lang="en-US" smtClean="0"/>
               <a:pPr/>
-              <a:t>11/29/2018</a:t>
+              <a:t>7/25/2019</a:t>
             </a:fld>
             <a:endParaRPr lang="en-US"/>
           </a:p>
@@ -2299,7 +2299,7 @@
             <a:fld id="{A9953F39-409C-4934-84CB-8EF94422C604}" type="datetimeFigureOut">
               <a:rPr lang="en-US" smtClean="0"/>
               <a:pPr/>
-              <a:t>11/29/2018</a:t>
+              <a:t>7/25/2019</a:t>
             </a:fld>
             <a:endParaRPr lang="en-US"/>
           </a:p>
@@ -2391,7 +2391,7 @@
             <a:fld id="{A9953F39-409C-4934-84CB-8EF94422C604}" type="datetimeFigureOut">
               <a:rPr lang="en-US" smtClean="0"/>
               <a:pPr/>
-              <a:t>11/29/2018</a:t>
+              <a:t>7/25/2019</a:t>
             </a:fld>
             <a:endParaRPr lang="en-US"/>
           </a:p>
@@ -2665,7 +2665,7 @@
             <a:fld id="{A9953F39-409C-4934-84CB-8EF94422C604}" type="datetimeFigureOut">
               <a:rPr lang="en-US" smtClean="0"/>
               <a:pPr/>
-              <a:t>11/29/2018</a:t>
+              <a:t>7/25/2019</a:t>
             </a:fld>
             <a:endParaRPr lang="en-US"/>
           </a:p>
@@ -2915,7 +2915,7 @@
             <a:fld id="{A9953F39-409C-4934-84CB-8EF94422C604}" type="datetimeFigureOut">
               <a:rPr lang="en-US" smtClean="0"/>
               <a:pPr/>
-              <a:t>11/29/2018</a:t>
+              <a:t>7/25/2019</a:t>
             </a:fld>
             <a:endParaRPr lang="en-US"/>
           </a:p>
@@ -3125,7 +3125,7 @@
             <a:fld id="{A9953F39-409C-4934-84CB-8EF94422C604}" type="datetimeFigureOut">
               <a:rPr lang="en-US" smtClean="0"/>
               <a:pPr/>
-              <a:t>11/29/2018</a:t>
+              <a:t>7/25/2019</a:t>
             </a:fld>
             <a:endParaRPr lang="en-US"/>
           </a:p>
@@ -5025,14 +5025,14 @@
           </a:prstGeom>
         </p:spPr>
         <p:style>
-          <a:lnRef idx="2">
-            <a:schemeClr val="dk1"/>
+          <a:lnRef idx="1">
+            <a:schemeClr val="accent6"/>
           </a:lnRef>
-          <a:fillRef idx="1">
-            <a:schemeClr val="lt1"/>
+          <a:fillRef idx="2">
+            <a:schemeClr val="accent6"/>
           </a:fillRef>
-          <a:effectRef idx="0">
-            <a:schemeClr val="dk1"/>
+          <a:effectRef idx="1">
+            <a:schemeClr val="accent6"/>
           </a:effectRef>
           <a:fontRef idx="minor">
             <a:schemeClr val="dk1"/>
@@ -5139,14 +5139,14 @@
           </a:prstGeom>
         </p:spPr>
         <p:style>
-          <a:lnRef idx="2">
-            <a:schemeClr val="dk1"/>
+          <a:lnRef idx="1">
+            <a:schemeClr val="accent4"/>
           </a:lnRef>
-          <a:fillRef idx="1">
-            <a:schemeClr val="lt1"/>
+          <a:fillRef idx="2">
+            <a:schemeClr val="accent4"/>
           </a:fillRef>
-          <a:effectRef idx="0">
-            <a:schemeClr val="dk1"/>
+          <a:effectRef idx="1">
+            <a:schemeClr val="accent4"/>
           </a:effectRef>
           <a:fontRef idx="minor">
             <a:schemeClr val="dk1"/>
@@ -5217,14 +5217,14 @@
           </a:prstGeom>
         </p:spPr>
         <p:style>
-          <a:lnRef idx="2">
-            <a:schemeClr val="dk1"/>
+          <a:lnRef idx="1">
+            <a:schemeClr val="accent3"/>
           </a:lnRef>
-          <a:fillRef idx="1">
-            <a:schemeClr val="lt1"/>
+          <a:fillRef idx="2">
+            <a:schemeClr val="accent3"/>
           </a:fillRef>
-          <a:effectRef idx="0">
-            <a:schemeClr val="dk1"/>
+          <a:effectRef idx="1">
+            <a:schemeClr val="accent3"/>
           </a:effectRef>
           <a:fontRef idx="minor">
             <a:schemeClr val="dk1"/>
@@ -5258,14 +5258,14 @@
           </a:prstGeom>
         </p:spPr>
         <p:style>
-          <a:lnRef idx="2">
-            <a:schemeClr val="dk1"/>
+          <a:lnRef idx="1">
+            <a:schemeClr val="accent5"/>
           </a:lnRef>
-          <a:fillRef idx="1">
-            <a:schemeClr val="lt1"/>
+          <a:fillRef idx="2">
+            <a:schemeClr val="accent5"/>
           </a:fillRef>
-          <a:effectRef idx="0">
-            <a:schemeClr val="dk1"/>
+          <a:effectRef idx="1">
+            <a:schemeClr val="accent5"/>
           </a:effectRef>
           <a:fontRef idx="minor">
             <a:schemeClr val="dk1"/>
@@ -5377,14 +5377,14 @@
           </a:prstGeom>
         </p:spPr>
         <p:style>
-          <a:lnRef idx="2">
-            <a:schemeClr val="dk1"/>
+          <a:lnRef idx="1">
+            <a:schemeClr val="accent1"/>
           </a:lnRef>
-          <a:fillRef idx="1">
-            <a:schemeClr val="lt1"/>
+          <a:fillRef idx="2">
+            <a:schemeClr val="accent1"/>
           </a:fillRef>
-          <a:effectRef idx="0">
-            <a:schemeClr val="dk1"/>
+          <a:effectRef idx="1">
+            <a:schemeClr val="accent1"/>
           </a:effectRef>
           <a:fontRef idx="minor">
             <a:schemeClr val="dk1"/>
@@ -5434,13 +5434,13 @@
           </a:prstGeom>
         </p:spPr>
         <p:style>
-          <a:lnRef idx="2">
+          <a:lnRef idx="1">
             <a:schemeClr val="dk1"/>
           </a:lnRef>
-          <a:fillRef idx="1">
-            <a:schemeClr val="lt1"/>
+          <a:fillRef idx="2">
+            <a:schemeClr val="dk1"/>
           </a:fillRef>
-          <a:effectRef idx="0">
+          <a:effectRef idx="1">
             <a:schemeClr val="dk1"/>
           </a:effectRef>
           <a:fontRef idx="minor">
@@ -5480,14 +5480,14 @@
           </a:prstGeom>
         </p:spPr>
         <p:style>
-          <a:lnRef idx="2">
-            <a:schemeClr val="dk1"/>
+          <a:lnRef idx="1">
+            <a:schemeClr val="accent3"/>
           </a:lnRef>
-          <a:fillRef idx="1">
-            <a:schemeClr val="lt1"/>
+          <a:fillRef idx="2">
+            <a:schemeClr val="accent3"/>
           </a:fillRef>
-          <a:effectRef idx="0">
-            <a:schemeClr val="dk1"/>
+          <a:effectRef idx="1">
+            <a:schemeClr val="accent3"/>
           </a:effectRef>
           <a:fontRef idx="minor">
             <a:schemeClr val="dk1"/>
@@ -5521,14 +5521,14 @@
           </a:prstGeom>
         </p:spPr>
         <p:style>
-          <a:lnRef idx="2">
-            <a:schemeClr val="dk1"/>
+          <a:lnRef idx="1">
+            <a:schemeClr val="accent5"/>
           </a:lnRef>
-          <a:fillRef idx="1">
-            <a:schemeClr val="lt1"/>
+          <a:fillRef idx="2">
+            <a:schemeClr val="accent5"/>
           </a:fillRef>
-          <a:effectRef idx="0">
-            <a:schemeClr val="dk1"/>
+          <a:effectRef idx="1">
+            <a:schemeClr val="accent5"/>
           </a:effectRef>
           <a:fontRef idx="minor">
             <a:schemeClr val="dk1"/>
@@ -5574,14 +5574,14 @@
           </a:prstGeom>
         </p:spPr>
         <p:style>
-          <a:lnRef idx="2">
-            <a:schemeClr val="dk1"/>
+          <a:lnRef idx="1">
+            <a:schemeClr val="accent3"/>
           </a:lnRef>
-          <a:fillRef idx="1">
-            <a:schemeClr val="lt1"/>
+          <a:fillRef idx="2">
+            <a:schemeClr val="accent3"/>
           </a:fillRef>
-          <a:effectRef idx="0">
-            <a:schemeClr val="dk1"/>
+          <a:effectRef idx="1">
+            <a:schemeClr val="accent3"/>
           </a:effectRef>
           <a:fontRef idx="minor">
             <a:schemeClr val="dk1"/>
@@ -5653,14 +5653,14 @@
           </a:prstGeom>
         </p:spPr>
         <p:style>
-          <a:lnRef idx="2">
-            <a:schemeClr val="dk1"/>
+          <a:lnRef idx="1">
+            <a:schemeClr val="accent6"/>
           </a:lnRef>
-          <a:fillRef idx="1">
-            <a:schemeClr val="lt1"/>
+          <a:fillRef idx="2">
+            <a:schemeClr val="accent6"/>
           </a:fillRef>
-          <a:effectRef idx="0">
-            <a:schemeClr val="dk1"/>
+          <a:effectRef idx="1">
+            <a:schemeClr val="accent6"/>
           </a:effectRef>
           <a:fontRef idx="minor">
             <a:schemeClr val="dk1"/>
@@ -5767,14 +5767,14 @@
           </a:prstGeom>
         </p:spPr>
         <p:style>
-          <a:lnRef idx="2">
-            <a:schemeClr val="dk1"/>
+          <a:lnRef idx="1">
+            <a:schemeClr val="accent5"/>
           </a:lnRef>
-          <a:fillRef idx="1">
-            <a:schemeClr val="lt1"/>
+          <a:fillRef idx="2">
+            <a:schemeClr val="accent5"/>
           </a:fillRef>
-          <a:effectRef idx="0">
-            <a:schemeClr val="dk1"/>
+          <a:effectRef idx="1">
+            <a:schemeClr val="accent5"/>
           </a:effectRef>
           <a:fontRef idx="minor">
             <a:schemeClr val="dk1"/>
@@ -5820,14 +5820,14 @@
           </a:prstGeom>
         </p:spPr>
         <p:style>
-          <a:lnRef idx="2">
-            <a:schemeClr val="dk1"/>
+          <a:lnRef idx="1">
+            <a:schemeClr val="accent3"/>
           </a:lnRef>
-          <a:fillRef idx="1">
-            <a:schemeClr val="lt1"/>
+          <a:fillRef idx="2">
+            <a:schemeClr val="accent3"/>
           </a:fillRef>
-          <a:effectRef idx="0">
-            <a:schemeClr val="dk1"/>
+          <a:effectRef idx="1">
+            <a:schemeClr val="accent3"/>
           </a:effectRef>
           <a:fontRef idx="minor">
             <a:schemeClr val="dk1"/>
@@ -6153,14 +6153,14 @@
           </a:prstGeom>
         </p:spPr>
         <p:style>
-          <a:lnRef idx="2">
-            <a:schemeClr val="dk1"/>
+          <a:lnRef idx="1">
+            <a:schemeClr val="accent5"/>
           </a:lnRef>
-          <a:fillRef idx="1">
-            <a:schemeClr val="lt1"/>
+          <a:fillRef idx="2">
+            <a:schemeClr val="accent5"/>
           </a:fillRef>
-          <a:effectRef idx="0">
-            <a:schemeClr val="dk1"/>
+          <a:effectRef idx="1">
+            <a:schemeClr val="accent5"/>
           </a:effectRef>
           <a:fontRef idx="minor">
             <a:schemeClr val="dk1"/>
@@ -6206,14 +6206,14 @@
           </a:prstGeom>
         </p:spPr>
         <p:style>
-          <a:lnRef idx="2">
-            <a:schemeClr val="dk1"/>
+          <a:lnRef idx="1">
+            <a:schemeClr val="accent3"/>
           </a:lnRef>
-          <a:fillRef idx="1">
-            <a:schemeClr val="lt1"/>
+          <a:fillRef idx="2">
+            <a:schemeClr val="accent3"/>
           </a:fillRef>
-          <a:effectRef idx="0">
-            <a:schemeClr val="dk1"/>
+          <a:effectRef idx="1">
+            <a:schemeClr val="accent3"/>
           </a:effectRef>
           <a:fontRef idx="minor">
             <a:schemeClr val="dk1"/>
@@ -6355,13 +6355,13 @@
           </a:prstGeom>
         </p:spPr>
         <p:style>
-          <a:lnRef idx="2">
+          <a:lnRef idx="1">
             <a:schemeClr val="dk1"/>
           </a:lnRef>
-          <a:fillRef idx="1">
-            <a:schemeClr val="lt1"/>
+          <a:fillRef idx="2">
+            <a:schemeClr val="dk1"/>
           </a:fillRef>
-          <a:effectRef idx="0">
+          <a:effectRef idx="1">
             <a:schemeClr val="dk1"/>
           </a:effectRef>
           <a:fontRef idx="minor">
@@ -6473,14 +6473,14 @@
           </a:prstGeom>
         </p:spPr>
         <p:style>
-          <a:lnRef idx="2">
-            <a:schemeClr val="dk1"/>
+          <a:lnRef idx="1">
+            <a:schemeClr val="accent5"/>
           </a:lnRef>
-          <a:fillRef idx="1">
-            <a:schemeClr val="lt1"/>
+          <a:fillRef idx="2">
+            <a:schemeClr val="accent5"/>
           </a:fillRef>
-          <a:effectRef idx="0">
-            <a:schemeClr val="dk1"/>
+          <a:effectRef idx="1">
+            <a:schemeClr val="accent5"/>
           </a:effectRef>
           <a:fontRef idx="minor">
             <a:schemeClr val="dk1"/>
@@ -6506,7 +6506,6 @@
               <a:rPr lang="en-IN" sz="1200" dirty="0" smtClean="0"/>
               <a:t>?</a:t>
             </a:r>
-            <a:endParaRPr lang="en-IN" sz="1200" dirty="0" smtClean="0"/>
           </a:p>
         </p:txBody>
       </p:sp>
@@ -6526,14 +6525,14 @@
           </a:prstGeom>
         </p:spPr>
         <p:style>
-          <a:lnRef idx="2">
-            <a:schemeClr val="dk1"/>
+          <a:lnRef idx="1">
+            <a:schemeClr val="accent5"/>
           </a:lnRef>
-          <a:fillRef idx="1">
-            <a:schemeClr val="lt1"/>
+          <a:fillRef idx="2">
+            <a:schemeClr val="accent5"/>
           </a:fillRef>
-          <a:effectRef idx="0">
-            <a:schemeClr val="dk1"/>
+          <a:effectRef idx="1">
+            <a:schemeClr val="accent5"/>
           </a:effectRef>
           <a:fontRef idx="minor">
             <a:schemeClr val="dk1"/>
@@ -6583,14 +6582,14 @@
           </a:prstGeom>
         </p:spPr>
         <p:style>
-          <a:lnRef idx="2">
-            <a:schemeClr val="dk1"/>
+          <a:lnRef idx="1">
+            <a:schemeClr val="accent3"/>
           </a:lnRef>
-          <a:fillRef idx="1">
-            <a:schemeClr val="lt1"/>
+          <a:fillRef idx="2">
+            <a:schemeClr val="accent3"/>
           </a:fillRef>
-          <a:effectRef idx="0">
-            <a:schemeClr val="dk1"/>
+          <a:effectRef idx="1">
+            <a:schemeClr val="accent3"/>
           </a:effectRef>
           <a:fontRef idx="minor">
             <a:schemeClr val="dk1"/>
@@ -6603,13 +6602,8 @@
             <a:pPr algn="ctr"/>
             <a:r>
               <a:rPr lang="en-IN" sz="1200" dirty="0" smtClean="0"/>
-              <a:t>get current word </a:t>
-            </a:r>
-            <a:r>
-              <a:rPr lang="en-IN" sz="1200" dirty="0" smtClean="0"/>
-              <a:t>along with count value</a:t>
-            </a:r>
-            <a:endParaRPr lang="en-IN" sz="1200" dirty="0" smtClean="0"/>
+              <a:t>get current word along with count value</a:t>
+            </a:r>
           </a:p>
         </p:txBody>
       </p:sp>
@@ -6665,14 +6659,14 @@
           </a:prstGeom>
         </p:spPr>
         <p:style>
-          <a:lnRef idx="2">
-            <a:schemeClr val="dk1"/>
+          <a:lnRef idx="1">
+            <a:schemeClr val="accent4"/>
           </a:lnRef>
-          <a:fillRef idx="1">
-            <a:schemeClr val="lt1"/>
+          <a:fillRef idx="2">
+            <a:schemeClr val="accent4"/>
           </a:fillRef>
-          <a:effectRef idx="0">
-            <a:schemeClr val="dk1"/>
+          <a:effectRef idx="1">
+            <a:schemeClr val="accent4"/>
           </a:effectRef>
           <a:fontRef idx="minor">
             <a:schemeClr val="dk1"/>
@@ -6815,14 +6809,14 @@
           </a:prstGeom>
         </p:spPr>
         <p:style>
-          <a:lnRef idx="2">
-            <a:schemeClr val="dk1"/>
+          <a:lnRef idx="1">
+            <a:schemeClr val="accent3"/>
           </a:lnRef>
-          <a:fillRef idx="1">
-            <a:schemeClr val="lt1"/>
+          <a:fillRef idx="2">
+            <a:schemeClr val="accent3"/>
           </a:fillRef>
-          <a:effectRef idx="0">
-            <a:schemeClr val="dk1"/>
+          <a:effectRef idx="1">
+            <a:schemeClr val="accent3"/>
           </a:effectRef>
           <a:fontRef idx="minor">
             <a:schemeClr val="dk1"/>

</xml_diff>